<commit_message>
move all mini lectures to same template
</commit_message>
<xml_diff>
--- a/assets/lectures/cbw-cshl/2019/mini/RNASeq_MiniLecture_07_Alignment_vs_Assembly_vs_Kmer.pptx
+++ b/assets/lectures/cbw-cshl/2019/mini/RNASeq_MiniLecture_07_Alignment_vs_Assembly_vs_Kmer.pptx
@@ -5,12 +5,10 @@
     <p:sldMasterId id="2147483660" r:id="rId1"/>
   </p:sldMasterIdLst>
   <p:notesMasterIdLst>
-    <p:notesMasterId r:id="rId5"/>
+    <p:notesMasterId r:id="rId3"/>
   </p:notesMasterIdLst>
   <p:sldIdLst>
-    <p:sldId id="257" r:id="rId2"/>
-    <p:sldId id="258" r:id="rId3"/>
-    <p:sldId id="259" r:id="rId4"/>
+    <p:sldId id="259" r:id="rId2"/>
   </p:sldIdLst>
   <p:sldSz cx="12192000" cy="6858000"/>
   <p:notesSz cx="6858000" cy="9144000"/>
@@ -199,7 +197,7 @@
           <a:p>
             <a:fld id="{827BD9F9-8452-A342-BB1B-28ECF19E2CC5}" type="datetimeFigureOut">
               <a:rPr lang="en-US" smtClean="0"/>
-              <a:t>3/4/19</a:t>
+              <a:t>3/11/19</a:t>
             </a:fld>
             <a:endParaRPr lang="en-US"/>
           </a:p>
@@ -720,14 +718,14 @@
           </a:ln>
           <a:extLst>
             <a:ext uri="{909E8E84-426E-40dd-AFC4-6F175D3DCCD1}">
-              <a14:hiddenFill xmlns:a14="http://schemas.microsoft.com/office/drawing/2010/main" xmlns="">
+              <a14:hiddenFill xmlns="" xmlns:a14="http://schemas.microsoft.com/office/drawing/2010/main">
                 <a:solidFill>
                   <a:srgbClr val="FFFFFF"/>
                 </a:solidFill>
               </a14:hiddenFill>
             </a:ext>
             <a:ext uri="{91240B29-F687-4f45-9708-019B960494DF}">
-              <a14:hiddenLine xmlns:a14="http://schemas.microsoft.com/office/drawing/2010/main" xmlns="" w="9525">
+              <a14:hiddenLine xmlns="" xmlns:a14="http://schemas.microsoft.com/office/drawing/2010/main" w="9525">
                 <a:solidFill>
                   <a:srgbClr val="000000"/>
                 </a:solidFill>
@@ -3483,14 +3481,14 @@
           </a:ln>
           <a:extLst>
             <a:ext uri="{909E8E84-426E-40dd-AFC4-6F175D3DCCD1}">
-              <a14:hiddenFill xmlns:a14="http://schemas.microsoft.com/office/drawing/2010/main" xmlns="">
+              <a14:hiddenFill xmlns="" xmlns:a14="http://schemas.microsoft.com/office/drawing/2010/main">
                 <a:solidFill>
                   <a:srgbClr val="FFFFFF"/>
                 </a:solidFill>
               </a14:hiddenFill>
             </a:ext>
             <a:ext uri="{91240B29-F687-4f45-9708-019B960494DF}">
-              <a14:hiddenLine xmlns:a14="http://schemas.microsoft.com/office/drawing/2010/main" xmlns="" w="9525">
+              <a14:hiddenLine xmlns="" xmlns:a14="http://schemas.microsoft.com/office/drawing/2010/main" w="9525">
                 <a:solidFill>
                   <a:srgbClr val="000000"/>
                 </a:solidFill>
@@ -3625,7 +3623,7 @@
                 <a:latin typeface="Calibri" charset="0"/>
                 <a:cs typeface="Calibri" charset="0"/>
               </a:rPr>
-              <a:t>Module </a:t>
+              <a:t>Module 7 </a:t>
             </a:r>
           </a:p>
         </p:txBody>
@@ -3772,19 +3770,7 @@
               <a:rPr lang="en-US" b="1" dirty="0" err="1">
                 <a:cs typeface="Arial" charset="0"/>
               </a:rPr>
-              <a:t>bio</a:t>
-            </a:r>
-            <a:r>
-              <a:rPr lang="en-US" dirty="0" err="1">
-                <a:cs typeface="Arial" charset="0"/>
-              </a:rPr>
-              <a:t>informatics</a:t>
-            </a:r>
-            <a:r>
-              <a:rPr lang="en-US" sz="1400" dirty="0" err="1">
-                <a:cs typeface="Arial" charset="0"/>
-              </a:rPr>
-              <a:t>.ca</a:t>
+              <a:t>rnabio.org</a:t>
             </a:r>
             <a:endParaRPr lang="en-US" dirty="0">
               <a:cs typeface="Arial" charset="0"/>
@@ -4116,510 +4102,6 @@
       </p:grpSpPr>
       <p:sp>
         <p:nvSpPr>
-          <p:cNvPr id="4" name="Rectangle 2">
-            <a:extLst>
-              <a:ext uri="{FF2B5EF4-FFF2-40B4-BE49-F238E27FC236}">
-                <a16:creationId xmlns:a16="http://schemas.microsoft.com/office/drawing/2014/main" id="{3951701B-699C-D042-8C4F-2B7A911EC7B7}"/>
-              </a:ext>
-            </a:extLst>
-          </p:cNvPr>
-          <p:cNvSpPr txBox="1">
-            <a:spLocks noChangeArrowheads="1"/>
-          </p:cNvSpPr>
-          <p:nvPr/>
-        </p:nvSpPr>
-        <p:spPr>
-          <a:xfrm>
-            <a:off x="931221" y="2489451"/>
-            <a:ext cx="10294920" cy="1447800"/>
-          </a:xfrm>
-          <a:prstGeom prst="rect">
-            <a:avLst/>
-          </a:prstGeom>
-        </p:spPr>
-        <p:txBody>
-          <a:bodyPr vert="horz" lIns="91440" tIns="45720" rIns="91440" bIns="45720" rtlCol="0" anchor="ctr">
-            <a:normAutofit/>
-          </a:bodyPr>
-          <a:lstStyle>
-            <a:lvl1pPr algn="l" defTabSz="914400" rtl="0" eaLnBrk="1" latinLnBrk="0" hangingPunct="1">
-              <a:lnSpc>
-                <a:spcPct val="90000"/>
-              </a:lnSpc>
-              <a:spcBef>
-                <a:spcPct val="0"/>
-              </a:spcBef>
-              <a:buNone/>
-              <a:defRPr sz="4400" kern="1200">
-                <a:solidFill>
-                  <a:schemeClr val="tx1"/>
-                </a:solidFill>
-                <a:latin typeface="+mj-lt"/>
-                <a:ea typeface="+mj-ea"/>
-                <a:cs typeface="+mj-cs"/>
-              </a:defRPr>
-            </a:lvl1pPr>
-          </a:lstStyle>
-          <a:p>
-            <a:pPr marL="0" marR="0" lvl="0" indent="0" algn="l" defTabSz="914400" rtl="0" eaLnBrk="1" fontAlgn="auto" latinLnBrk="0" hangingPunct="1">
-              <a:lnSpc>
-                <a:spcPct val="90000"/>
-              </a:lnSpc>
-              <a:spcBef>
-                <a:spcPct val="0"/>
-              </a:spcBef>
-              <a:spcAft>
-                <a:spcPts val="0"/>
-              </a:spcAft>
-              <a:buClrTx/>
-              <a:buSzTx/>
-              <a:buFontTx/>
-              <a:buNone/>
-              <a:tabLst/>
-              <a:defRPr/>
-            </a:pPr>
-            <a:r>
-              <a:rPr kumimoji="0" lang="en-US" sz="4400" b="0" i="0" u="none" strike="noStrike" kern="1200" cap="none" spc="0" normalizeH="0" baseline="0" noProof="0" dirty="0">
-                <a:ln>
-                  <a:noFill/>
-                </a:ln>
-                <a:solidFill>
-                  <a:srgbClr val="9A3334"/>
-                </a:solidFill>
-                <a:effectLst/>
-                <a:uLnTx/>
-                <a:uFillTx/>
-                <a:latin typeface="Verdana" panose="020B0604030504040204" pitchFamily="34" charset="0"/>
-                <a:ea typeface="Verdana" panose="020B0604030504040204" pitchFamily="34" charset="0"/>
-                <a:cs typeface="Verdana" panose="020B0604030504040204" pitchFamily="34" charset="0"/>
-              </a:rPr>
-              <a:t>Canadian Bioinformatics Workshops</a:t>
-            </a:r>
-          </a:p>
-        </p:txBody>
-      </p:sp>
-      <p:sp>
-        <p:nvSpPr>
-          <p:cNvPr id="5" name="Rectangle 3">
-            <a:extLst>
-              <a:ext uri="{FF2B5EF4-FFF2-40B4-BE49-F238E27FC236}">
-                <a16:creationId xmlns:a16="http://schemas.microsoft.com/office/drawing/2014/main" id="{F9B358B9-3A44-4642-B0D6-A899FE00280C}"/>
-              </a:ext>
-            </a:extLst>
-          </p:cNvPr>
-          <p:cNvSpPr txBox="1">
-            <a:spLocks noChangeArrowheads="1"/>
-          </p:cNvSpPr>
-          <p:nvPr/>
-        </p:nvSpPr>
-        <p:spPr>
-          <a:xfrm>
-            <a:off x="2058889" y="3719450"/>
-            <a:ext cx="8039584" cy="1927225"/>
-          </a:xfrm>
-          <a:prstGeom prst="rect">
-            <a:avLst/>
-          </a:prstGeom>
-        </p:spPr>
-        <p:txBody>
-          <a:bodyPr vert="horz" lIns="91440" tIns="45720" rIns="91440" bIns="45720" rtlCol="0">
-            <a:normAutofit/>
-          </a:bodyPr>
-          <a:lstStyle>
-            <a:lvl1pPr marL="228600" indent="-228600" algn="l" defTabSz="914400" rtl="0" eaLnBrk="1" latinLnBrk="0" hangingPunct="1">
-              <a:lnSpc>
-                <a:spcPct val="90000"/>
-              </a:lnSpc>
-              <a:spcBef>
-                <a:spcPts val="1000"/>
-              </a:spcBef>
-              <a:buFont typeface="Arial" panose="020B0604020202020204" pitchFamily="34" charset="0"/>
-              <a:buChar char="•"/>
-              <a:defRPr sz="2800" kern="1200">
-                <a:solidFill>
-                  <a:schemeClr val="tx1"/>
-                </a:solidFill>
-                <a:latin typeface="+mn-lt"/>
-                <a:ea typeface="+mn-ea"/>
-                <a:cs typeface="+mn-cs"/>
-              </a:defRPr>
-            </a:lvl1pPr>
-            <a:lvl2pPr marL="685800" indent="-228600" algn="l" defTabSz="914400" rtl="0" eaLnBrk="1" latinLnBrk="0" hangingPunct="1">
-              <a:lnSpc>
-                <a:spcPct val="90000"/>
-              </a:lnSpc>
-              <a:spcBef>
-                <a:spcPts val="500"/>
-              </a:spcBef>
-              <a:buFont typeface="Arial" panose="020B0604020202020204" pitchFamily="34" charset="0"/>
-              <a:buChar char="•"/>
-              <a:defRPr sz="2400" kern="1200">
-                <a:solidFill>
-                  <a:schemeClr val="tx1"/>
-                </a:solidFill>
-                <a:latin typeface="+mn-lt"/>
-                <a:ea typeface="+mn-ea"/>
-                <a:cs typeface="+mn-cs"/>
-              </a:defRPr>
-            </a:lvl2pPr>
-            <a:lvl3pPr marL="1143000" indent="-228600" algn="l" defTabSz="914400" rtl="0" eaLnBrk="1" latinLnBrk="0" hangingPunct="1">
-              <a:lnSpc>
-                <a:spcPct val="90000"/>
-              </a:lnSpc>
-              <a:spcBef>
-                <a:spcPts val="500"/>
-              </a:spcBef>
-              <a:buFont typeface="Arial" panose="020B0604020202020204" pitchFamily="34" charset="0"/>
-              <a:buChar char="•"/>
-              <a:defRPr sz="2000" kern="1200">
-                <a:solidFill>
-                  <a:schemeClr val="tx1"/>
-                </a:solidFill>
-                <a:latin typeface="+mn-lt"/>
-                <a:ea typeface="+mn-ea"/>
-                <a:cs typeface="+mn-cs"/>
-              </a:defRPr>
-            </a:lvl3pPr>
-            <a:lvl4pPr marL="1600200" indent="-228600" algn="l" defTabSz="914400" rtl="0" eaLnBrk="1" latinLnBrk="0" hangingPunct="1">
-              <a:lnSpc>
-                <a:spcPct val="90000"/>
-              </a:lnSpc>
-              <a:spcBef>
-                <a:spcPts val="500"/>
-              </a:spcBef>
-              <a:buFont typeface="Arial" panose="020B0604020202020204" pitchFamily="34" charset="0"/>
-              <a:buChar char="•"/>
-              <a:defRPr sz="1800" kern="1200">
-                <a:solidFill>
-                  <a:schemeClr val="tx1"/>
-                </a:solidFill>
-                <a:latin typeface="+mn-lt"/>
-                <a:ea typeface="+mn-ea"/>
-                <a:cs typeface="+mn-cs"/>
-              </a:defRPr>
-            </a:lvl4pPr>
-            <a:lvl5pPr marL="2057400" indent="-228600" algn="l" defTabSz="914400" rtl="0" eaLnBrk="1" latinLnBrk="0" hangingPunct="1">
-              <a:lnSpc>
-                <a:spcPct val="90000"/>
-              </a:lnSpc>
-              <a:spcBef>
-                <a:spcPts val="500"/>
-              </a:spcBef>
-              <a:buFont typeface="Arial" panose="020B0604020202020204" pitchFamily="34" charset="0"/>
-              <a:buChar char="•"/>
-              <a:defRPr sz="1800" kern="1200">
-                <a:solidFill>
-                  <a:schemeClr val="tx1"/>
-                </a:solidFill>
-                <a:latin typeface="+mn-lt"/>
-                <a:ea typeface="+mn-ea"/>
-                <a:cs typeface="+mn-cs"/>
-              </a:defRPr>
-            </a:lvl5pPr>
-            <a:lvl6pPr marL="2514600" indent="-228600" algn="l" defTabSz="914400" rtl="0" eaLnBrk="1" latinLnBrk="0" hangingPunct="1">
-              <a:lnSpc>
-                <a:spcPct val="90000"/>
-              </a:lnSpc>
-              <a:spcBef>
-                <a:spcPts val="500"/>
-              </a:spcBef>
-              <a:buFont typeface="Arial" panose="020B0604020202020204" pitchFamily="34" charset="0"/>
-              <a:buChar char="•"/>
-              <a:defRPr sz="1800" kern="1200">
-                <a:solidFill>
-                  <a:schemeClr val="tx1"/>
-                </a:solidFill>
-                <a:latin typeface="+mn-lt"/>
-                <a:ea typeface="+mn-ea"/>
-                <a:cs typeface="+mn-cs"/>
-              </a:defRPr>
-            </a:lvl6pPr>
-            <a:lvl7pPr marL="2971800" indent="-228600" algn="l" defTabSz="914400" rtl="0" eaLnBrk="1" latinLnBrk="0" hangingPunct="1">
-              <a:lnSpc>
-                <a:spcPct val="90000"/>
-              </a:lnSpc>
-              <a:spcBef>
-                <a:spcPts val="500"/>
-              </a:spcBef>
-              <a:buFont typeface="Arial" panose="020B0604020202020204" pitchFamily="34" charset="0"/>
-              <a:buChar char="•"/>
-              <a:defRPr sz="1800" kern="1200">
-                <a:solidFill>
-                  <a:schemeClr val="tx1"/>
-                </a:solidFill>
-                <a:latin typeface="+mn-lt"/>
-                <a:ea typeface="+mn-ea"/>
-                <a:cs typeface="+mn-cs"/>
-              </a:defRPr>
-            </a:lvl7pPr>
-            <a:lvl8pPr marL="3429000" indent="-228600" algn="l" defTabSz="914400" rtl="0" eaLnBrk="1" latinLnBrk="0" hangingPunct="1">
-              <a:lnSpc>
-                <a:spcPct val="90000"/>
-              </a:lnSpc>
-              <a:spcBef>
-                <a:spcPts val="500"/>
-              </a:spcBef>
-              <a:buFont typeface="Arial" panose="020B0604020202020204" pitchFamily="34" charset="0"/>
-              <a:buChar char="•"/>
-              <a:defRPr sz="1800" kern="1200">
-                <a:solidFill>
-                  <a:schemeClr val="tx1"/>
-                </a:solidFill>
-                <a:latin typeface="+mn-lt"/>
-                <a:ea typeface="+mn-ea"/>
-                <a:cs typeface="+mn-cs"/>
-              </a:defRPr>
-            </a:lvl8pPr>
-            <a:lvl9pPr marL="3886200" indent="-228600" algn="l" defTabSz="914400" rtl="0" eaLnBrk="1" latinLnBrk="0" hangingPunct="1">
-              <a:lnSpc>
-                <a:spcPct val="90000"/>
-              </a:lnSpc>
-              <a:spcBef>
-                <a:spcPts val="500"/>
-              </a:spcBef>
-              <a:buFont typeface="Arial" panose="020B0604020202020204" pitchFamily="34" charset="0"/>
-              <a:buChar char="•"/>
-              <a:defRPr sz="1800" kern="1200">
-                <a:solidFill>
-                  <a:schemeClr val="tx1"/>
-                </a:solidFill>
-                <a:latin typeface="+mn-lt"/>
-                <a:ea typeface="+mn-ea"/>
-                <a:cs typeface="+mn-cs"/>
-              </a:defRPr>
-            </a:lvl9pPr>
-          </a:lstStyle>
-          <a:p>
-            <a:pPr marL="0" marR="0" lvl="0" indent="0" algn="ctr" defTabSz="914400" rtl="0" eaLnBrk="1" fontAlgn="auto" latinLnBrk="0" hangingPunct="1">
-              <a:lnSpc>
-                <a:spcPct val="90000"/>
-              </a:lnSpc>
-              <a:spcBef>
-                <a:spcPts val="1000"/>
-              </a:spcBef>
-              <a:spcAft>
-                <a:spcPts val="0"/>
-              </a:spcAft>
-              <a:buClrTx/>
-              <a:buSzTx/>
-              <a:buFont typeface="Arial" charset="0"/>
-              <a:buNone/>
-              <a:tabLst/>
-              <a:defRPr/>
-            </a:pPr>
-            <a:r>
-              <a:rPr kumimoji="0" lang="en-US" sz="2800" b="0" i="0" u="none" strike="noStrike" kern="1200" cap="none" spc="0" normalizeH="0" baseline="0" noProof="0" dirty="0" err="1">
-                <a:ln>
-                  <a:noFill/>
-                </a:ln>
-                <a:solidFill>
-                  <a:prstClr val="black"/>
-                </a:solidFill>
-                <a:effectLst/>
-                <a:uLnTx/>
-                <a:uFillTx/>
-                <a:latin typeface="Verdana" panose="020B0604030504040204"/>
-                <a:ea typeface="ＭＳ Ｐゴシック" charset="0"/>
-                <a:cs typeface="ＭＳ Ｐゴシック" charset="0"/>
-              </a:rPr>
-              <a:t>www.bioinformatics.ca</a:t>
-            </a:r>
-            <a:endParaRPr kumimoji="0" lang="en-US" sz="2800" b="0" i="0" u="none" strike="noStrike" kern="1200" cap="none" spc="0" normalizeH="0" baseline="0" noProof="0" dirty="0">
-              <a:ln>
-                <a:noFill/>
-              </a:ln>
-              <a:solidFill>
-                <a:prstClr val="black"/>
-              </a:solidFill>
-              <a:effectLst/>
-              <a:uLnTx/>
-              <a:uFillTx/>
-              <a:latin typeface="Verdana" panose="020B0604030504040204"/>
-              <a:ea typeface="ＭＳ Ｐゴシック" charset="0"/>
-              <a:cs typeface="ＭＳ Ｐゴシック" charset="0"/>
-            </a:endParaRPr>
-          </a:p>
-          <a:p>
-            <a:pPr marL="0" marR="0" lvl="0" indent="0" algn="ctr" defTabSz="914400" rtl="0" eaLnBrk="1" fontAlgn="auto" latinLnBrk="0" hangingPunct="1">
-              <a:lnSpc>
-                <a:spcPct val="90000"/>
-              </a:lnSpc>
-              <a:spcBef>
-                <a:spcPts val="1000"/>
-              </a:spcBef>
-              <a:spcAft>
-                <a:spcPts val="0"/>
-              </a:spcAft>
-              <a:buClrTx/>
-              <a:buSzTx/>
-              <a:buFont typeface="Arial" charset="0"/>
-              <a:buNone/>
-              <a:tabLst/>
-              <a:defRPr/>
-            </a:pPr>
-            <a:r>
-              <a:rPr kumimoji="0" lang="en-US" sz="2800" b="0" i="0" u="none" strike="noStrike" kern="1200" cap="none" spc="0" normalizeH="0" baseline="0" noProof="0" dirty="0" err="1">
-                <a:ln>
-                  <a:noFill/>
-                </a:ln>
-                <a:solidFill>
-                  <a:prstClr val="black"/>
-                </a:solidFill>
-                <a:effectLst/>
-                <a:uLnTx/>
-                <a:uFillTx/>
-                <a:latin typeface="Verdana" panose="020B0604030504040204"/>
-                <a:ea typeface="ＭＳ Ｐゴシック" charset="0"/>
-                <a:cs typeface="ＭＳ Ｐゴシック" charset="0"/>
-              </a:rPr>
-              <a:t>bioinformaticsdotca.github.io</a:t>
-            </a:r>
-            <a:endParaRPr kumimoji="0" lang="en-US" sz="2800" b="0" i="0" u="none" strike="noStrike" kern="1200" cap="none" spc="0" normalizeH="0" baseline="0" noProof="0" dirty="0">
-              <a:ln>
-                <a:noFill/>
-              </a:ln>
-              <a:solidFill>
-                <a:prstClr val="black"/>
-              </a:solidFill>
-              <a:effectLst/>
-              <a:uLnTx/>
-              <a:uFillTx/>
-              <a:latin typeface="Verdana" panose="020B0604030504040204"/>
-              <a:ea typeface="ＭＳ Ｐゴシック" charset="0"/>
-              <a:cs typeface="ＭＳ Ｐゴシック" charset="0"/>
-            </a:endParaRPr>
-          </a:p>
-        </p:txBody>
-      </p:sp>
-      <p:pic>
-        <p:nvPicPr>
-          <p:cNvPr id="6" name="Picture 5">
-            <a:extLst>
-              <a:ext uri="{FF2B5EF4-FFF2-40B4-BE49-F238E27FC236}">
-                <a16:creationId xmlns:a16="http://schemas.microsoft.com/office/drawing/2014/main" id="{7E3CC30E-EF41-4A4B-AD78-53A11C3D8B87}"/>
-              </a:ext>
-            </a:extLst>
-          </p:cNvPr>
-          <p:cNvPicPr>
-            <a:picLocks noChangeAspect="1"/>
-          </p:cNvPicPr>
-          <p:nvPr/>
-        </p:nvPicPr>
-        <p:blipFill>
-          <a:blip r:embed="rId2"/>
-          <a:stretch>
-            <a:fillRect/>
-          </a:stretch>
-        </p:blipFill>
-        <p:spPr>
-          <a:xfrm>
-            <a:off x="10608072" y="5106390"/>
-            <a:ext cx="1583928" cy="1313871"/>
-          </a:xfrm>
-          <a:prstGeom prst="rect">
-            <a:avLst/>
-          </a:prstGeom>
-        </p:spPr>
-      </p:pic>
-    </p:spTree>
-    <p:extLst>
-      <p:ext uri="{BB962C8B-B14F-4D97-AF65-F5344CB8AC3E}">
-        <p14:creationId xmlns:p14="http://schemas.microsoft.com/office/powerpoint/2010/main" val="454110252"/>
-      </p:ext>
-    </p:extLst>
-  </p:cSld>
-  <p:clrMapOvr>
-    <a:masterClrMapping/>
-  </p:clrMapOvr>
-</p:sld>
-</file>
-
-<file path=ppt/slides/slide2.xml><?xml version="1.0" encoding="utf-8"?>
-<p:sld xmlns:a="http://schemas.openxmlformats.org/drawingml/2006/main" xmlns:r="http://schemas.openxmlformats.org/officeDocument/2006/relationships" xmlns:p="http://schemas.openxmlformats.org/presentationml/2006/main">
-  <p:cSld>
-    <p:spTree>
-      <p:nvGrpSpPr>
-        <p:cNvPr id="1" name=""/>
-        <p:cNvGrpSpPr/>
-        <p:nvPr/>
-      </p:nvGrpSpPr>
-      <p:grpSpPr>
-        <a:xfrm>
-          <a:off x="0" y="0"/>
-          <a:ext cx="0" cy="0"/>
-          <a:chOff x="0" y="0"/>
-          <a:chExt cx="0" cy="0"/>
-        </a:xfrm>
-      </p:grpSpPr>
-      <p:pic>
-        <p:nvPicPr>
-          <p:cNvPr id="4" name="Content Placeholder 9" descr="Picture 1.png">
-            <a:extLst>
-              <a:ext uri="{FF2B5EF4-FFF2-40B4-BE49-F238E27FC236}">
-                <a16:creationId xmlns:a16="http://schemas.microsoft.com/office/drawing/2014/main" id="{548BE5EC-9575-1847-9F91-986B05624E52}"/>
-              </a:ext>
-            </a:extLst>
-          </p:cNvPr>
-          <p:cNvPicPr>
-            <a:picLocks noChangeAspect="1"/>
-          </p:cNvPicPr>
-          <p:nvPr/>
-        </p:nvPicPr>
-        <p:blipFill>
-          <a:blip r:embed="rId2">
-            <a:extLst>
-              <a:ext uri="{28A0092B-C50C-407E-A947-70E740481C1C}">
-                <a14:useLocalDpi xmlns:a14="http://schemas.microsoft.com/office/drawing/2010/main" val="0"/>
-              </a:ext>
-            </a:extLst>
-          </a:blip>
-          <a:srcRect/>
-          <a:stretch>
-            <a:fillRect/>
-          </a:stretch>
-        </p:blipFill>
-        <p:spPr>
-          <a:xfrm>
-            <a:off x="2822576" y="0"/>
-            <a:ext cx="6518495" cy="6400800"/>
-          </a:xfrm>
-          <a:prstGeom prst="rect">
-            <a:avLst/>
-          </a:prstGeom>
-        </p:spPr>
-      </p:pic>
-    </p:spTree>
-    <p:extLst>
-      <p:ext uri="{BB962C8B-B14F-4D97-AF65-F5344CB8AC3E}">
-        <p14:creationId xmlns:p14="http://schemas.microsoft.com/office/powerpoint/2010/main" val="1334057523"/>
-      </p:ext>
-    </p:extLst>
-  </p:cSld>
-  <p:clrMapOvr>
-    <a:masterClrMapping/>
-  </p:clrMapOvr>
-</p:sld>
-</file>
-
-<file path=ppt/slides/slide3.xml><?xml version="1.0" encoding="utf-8"?>
-<p:sld xmlns:a="http://schemas.openxmlformats.org/drawingml/2006/main" xmlns:r="http://schemas.openxmlformats.org/officeDocument/2006/relationships" xmlns:p="http://schemas.openxmlformats.org/presentationml/2006/main">
-  <p:cSld>
-    <p:spTree>
-      <p:nvGrpSpPr>
-        <p:cNvPr id="1" name=""/>
-        <p:cNvGrpSpPr/>
-        <p:nvPr/>
-      </p:nvGrpSpPr>
-      <p:grpSpPr>
-        <a:xfrm>
-          <a:off x="0" y="0"/>
-          <a:ext cx="0" cy="0"/>
-          <a:chOff x="0" y="0"/>
-          <a:chExt cx="0" cy="0"/>
-        </a:xfrm>
-      </p:grpSpPr>
-      <p:sp>
-        <p:nvSpPr>
           <p:cNvPr id="2" name="Title 1">
             <a:extLst>
               <a:ext uri="{FF2B5EF4-FFF2-40B4-BE49-F238E27FC236}">
@@ -4678,7 +4160,7 @@
               <a:t> Module 2</a:t>
             </a:r>
             <a:br>
-              <a:rPr lang="en-US" sz="3600">
+              <a:rPr lang="en-US" sz="3600" dirty="0">
                 <a:solidFill>
                   <a:schemeClr val="bg1"/>
                 </a:solidFill>
@@ -4687,14 +4169,24 @@
               </a:rPr>
             </a:br>
             <a:r>
-              <a:rPr lang="en-US" sz="3600">
+              <a:rPr lang="en-US" sz="3600" dirty="0">
                 <a:solidFill>
                   <a:schemeClr val="bg1"/>
                 </a:solidFill>
                 <a:latin typeface="Calibri" charset="0"/>
                 <a:cs typeface="Segoe UI" charset="0"/>
               </a:rPr>
-              <a:t>Alignment</a:t>
+              <a:t>Alignment vs Assembly vs </a:t>
+            </a:r>
+            <a:r>
+              <a:rPr lang="en-US" sz="3600">
+                <a:solidFill>
+                  <a:schemeClr val="bg1"/>
+                </a:solidFill>
+                <a:latin typeface="Calibri" charset="0"/>
+                <a:cs typeface="Segoe UI" charset="0"/>
+              </a:rPr>
+              <a:t>Kmer</a:t>
             </a:r>
             <a:endParaRPr lang="en-US" sz="3200" b="1" dirty="0">
               <a:solidFill>
@@ -4754,28 +4246,6 @@
                 <a:schemeClr val="bg1"/>
               </a:solidFill>
             </a:endParaRPr>
-          </a:p>
-          <a:p>
-            <a:pPr algn="r"/>
-            <a:r>
-              <a:rPr lang="en-US" dirty="0">
-                <a:solidFill>
-                  <a:schemeClr val="bg1"/>
-                </a:solidFill>
-              </a:rPr>
-              <a:t>High-Throughput Biology: From Sequence to Networks</a:t>
-            </a:r>
-          </a:p>
-          <a:p>
-            <a:pPr algn="r"/>
-            <a:r>
-              <a:rPr lang="en-US" dirty="0">
-                <a:solidFill>
-                  <a:schemeClr val="bg1"/>
-                </a:solidFill>
-              </a:rPr>
-              <a:t>March 11-17, 2019</a:t>
-            </a:r>
           </a:p>
         </p:txBody>
       </p:sp>
@@ -4915,14 +4385,14 @@
           </a:ln>
           <a:extLst>
             <a:ext uri="{909E8E84-426E-40dd-AFC4-6F175D3DCCD1}">
-              <a14:hiddenFill xmlns:a14="http://schemas.microsoft.com/office/drawing/2010/main" xmlns="">
+              <a14:hiddenFill xmlns="" xmlns:a14="http://schemas.microsoft.com/office/drawing/2010/main">
                 <a:solidFill>
                   <a:srgbClr val="FFFFFF"/>
                 </a:solidFill>
               </a14:hiddenFill>
             </a:ext>
             <a:ext uri="{91240B29-F687-4f45-9708-019B960494DF}">
-              <a14:hiddenLine xmlns:a14="http://schemas.microsoft.com/office/drawing/2010/main" xmlns="" w="9525">
+              <a14:hiddenLine xmlns="" xmlns:a14="http://schemas.microsoft.com/office/drawing/2010/main" w="9525">
                 <a:solidFill>
                   <a:srgbClr val="000000"/>
                 </a:solidFill>

</xml_diff>